<commit_message>
Update flow to relfect AS3
</commit_message>
<xml_diff>
--- a/DOCS/flow.pptx
+++ b/DOCS/flow.pptx
@@ -260,7 +260,7 @@
           <a:p>
             <a:fld id="{9C63C970-45C1-CB47-BFD7-7A762275AA35}" type="datetimeFigureOut">
               <a:rPr lang="en-US" smtClean="0"/>
-              <a:t>3/1/18</a:t>
+              <a:t>3/13/18</a:t>
             </a:fld>
             <a:endParaRPr lang="en-US"/>
           </a:p>
@@ -458,7 +458,7 @@
           <a:p>
             <a:fld id="{9C63C970-45C1-CB47-BFD7-7A762275AA35}" type="datetimeFigureOut">
               <a:rPr lang="en-US" smtClean="0"/>
-              <a:t>3/1/18</a:t>
+              <a:t>3/13/18</a:t>
             </a:fld>
             <a:endParaRPr lang="en-US"/>
           </a:p>
@@ -666,7 +666,7 @@
           <a:p>
             <a:fld id="{9C63C970-45C1-CB47-BFD7-7A762275AA35}" type="datetimeFigureOut">
               <a:rPr lang="en-US" smtClean="0"/>
-              <a:t>3/1/18</a:t>
+              <a:t>3/13/18</a:t>
             </a:fld>
             <a:endParaRPr lang="en-US"/>
           </a:p>
@@ -864,7 +864,7 @@
           <a:p>
             <a:fld id="{9C63C970-45C1-CB47-BFD7-7A762275AA35}" type="datetimeFigureOut">
               <a:rPr lang="en-US" smtClean="0"/>
-              <a:t>3/1/18</a:t>
+              <a:t>3/13/18</a:t>
             </a:fld>
             <a:endParaRPr lang="en-US"/>
           </a:p>
@@ -1139,7 +1139,7 @@
           <a:p>
             <a:fld id="{9C63C970-45C1-CB47-BFD7-7A762275AA35}" type="datetimeFigureOut">
               <a:rPr lang="en-US" smtClean="0"/>
-              <a:t>3/1/18</a:t>
+              <a:t>3/13/18</a:t>
             </a:fld>
             <a:endParaRPr lang="en-US"/>
           </a:p>
@@ -1404,7 +1404,7 @@
           <a:p>
             <a:fld id="{9C63C970-45C1-CB47-BFD7-7A762275AA35}" type="datetimeFigureOut">
               <a:rPr lang="en-US" smtClean="0"/>
-              <a:t>3/1/18</a:t>
+              <a:t>3/13/18</a:t>
             </a:fld>
             <a:endParaRPr lang="en-US"/>
           </a:p>
@@ -1816,7 +1816,7 @@
           <a:p>
             <a:fld id="{9C63C970-45C1-CB47-BFD7-7A762275AA35}" type="datetimeFigureOut">
               <a:rPr lang="en-US" smtClean="0"/>
-              <a:t>3/1/18</a:t>
+              <a:t>3/13/18</a:t>
             </a:fld>
             <a:endParaRPr lang="en-US"/>
           </a:p>
@@ -1957,7 +1957,7 @@
           <a:p>
             <a:fld id="{9C63C970-45C1-CB47-BFD7-7A762275AA35}" type="datetimeFigureOut">
               <a:rPr lang="en-US" smtClean="0"/>
-              <a:t>3/1/18</a:t>
+              <a:t>3/13/18</a:t>
             </a:fld>
             <a:endParaRPr lang="en-US"/>
           </a:p>
@@ -2070,7 +2070,7 @@
           <a:p>
             <a:fld id="{9C63C970-45C1-CB47-BFD7-7A762275AA35}" type="datetimeFigureOut">
               <a:rPr lang="en-US" smtClean="0"/>
-              <a:t>3/1/18</a:t>
+              <a:t>3/13/18</a:t>
             </a:fld>
             <a:endParaRPr lang="en-US"/>
           </a:p>
@@ -2381,7 +2381,7 @@
           <a:p>
             <a:fld id="{9C63C970-45C1-CB47-BFD7-7A762275AA35}" type="datetimeFigureOut">
               <a:rPr lang="en-US" smtClean="0"/>
-              <a:t>3/1/18</a:t>
+              <a:t>3/13/18</a:t>
             </a:fld>
             <a:endParaRPr lang="en-US"/>
           </a:p>
@@ -2669,7 +2669,7 @@
           <a:p>
             <a:fld id="{9C63C970-45C1-CB47-BFD7-7A762275AA35}" type="datetimeFigureOut">
               <a:rPr lang="en-US" smtClean="0"/>
-              <a:t>3/1/18</a:t>
+              <a:t>3/13/18</a:t>
             </a:fld>
             <a:endParaRPr lang="en-US"/>
           </a:p>
@@ -2910,7 +2910,7 @@
           <a:p>
             <a:fld id="{9C63C970-45C1-CB47-BFD7-7A762275AA35}" type="datetimeFigureOut">
               <a:rPr lang="en-US" smtClean="0"/>
-              <a:t>3/1/18</a:t>
+              <a:t>3/13/18</a:t>
             </a:fld>
             <a:endParaRPr lang="en-US"/>
           </a:p>
@@ -3336,17 +3336,24 @@
               </a:ext>
             </a:extLst>
           </p:cNvPr>
-          <p:cNvCxnSpPr/>
+          <p:cNvCxnSpPr>
+            <a:cxnSpLocks/>
+          </p:cNvCxnSpPr>
           <p:nvPr/>
         </p:nvCxnSpPr>
         <p:spPr>
           <a:xfrm>
-            <a:off x="537884" y="1353991"/>
-            <a:ext cx="0" cy="2743627"/>
+            <a:off x="2558317" y="838947"/>
+            <a:ext cx="0" cy="5666353"/>
           </a:xfrm>
           <a:prstGeom prst="line">
             <a:avLst/>
           </a:prstGeom>
+          <a:ln>
+            <a:solidFill>
+              <a:schemeClr val="accent2"/>
+            </a:solidFill>
+          </a:ln>
         </p:spPr>
         <p:style>
           <a:lnRef idx="1">
@@ -3377,13 +3384,18 @@
         </p:nvSpPr>
         <p:spPr>
           <a:xfrm>
-            <a:off x="-32275" y="279700"/>
-            <a:ext cx="1183342" cy="1077218"/>
+            <a:off x="1684212" y="278486"/>
+            <a:ext cx="1732531" cy="552784"/>
           </a:xfrm>
           <a:prstGeom prst="rect">
             <a:avLst/>
           </a:prstGeom>
           <a:noFill/>
+          <a:ln>
+            <a:solidFill>
+              <a:schemeClr val="accent2"/>
+            </a:solidFill>
+          </a:ln>
         </p:spPr>
         <p:txBody>
           <a:bodyPr wrap="square" rtlCol="0">
@@ -3424,7 +3436,7 @@
         </p:nvCxnSpPr>
         <p:spPr>
           <a:xfrm>
-            <a:off x="799400" y="1570610"/>
+            <a:off x="2819833" y="1143878"/>
             <a:ext cx="1875921" cy="0"/>
           </a:xfrm>
           <a:prstGeom prst="straightConnector1">
@@ -3463,12 +3475,17 @@
         </p:nvCxnSpPr>
         <p:spPr>
           <a:xfrm>
-            <a:off x="2970904" y="1310322"/>
-            <a:ext cx="0" cy="961624"/>
+            <a:off x="4834580" y="872492"/>
+            <a:ext cx="0" cy="1279922"/>
           </a:xfrm>
           <a:prstGeom prst="line">
             <a:avLst/>
           </a:prstGeom>
+          <a:ln>
+            <a:solidFill>
+              <a:schemeClr val="accent2"/>
+            </a:solidFill>
+          </a:ln>
         </p:spPr>
         <p:style>
           <a:lnRef idx="1">
@@ -3499,13 +3516,18 @@
         </p:nvSpPr>
         <p:spPr>
           <a:xfrm>
-            <a:off x="1702605" y="655246"/>
+            <a:off x="3566281" y="280766"/>
             <a:ext cx="2536598" cy="584775"/>
           </a:xfrm>
           <a:prstGeom prst="rect">
             <a:avLst/>
           </a:prstGeom>
           <a:noFill/>
+          <a:ln>
+            <a:solidFill>
+              <a:schemeClr val="accent2"/>
+            </a:solidFill>
+          </a:ln>
         </p:spPr>
         <p:txBody>
           <a:bodyPr wrap="square" rtlCol="0">
@@ -3548,12 +3570,17 @@
         </p:nvCxnSpPr>
         <p:spPr>
           <a:xfrm>
-            <a:off x="4513658" y="1924669"/>
-            <a:ext cx="0" cy="2743627"/>
+            <a:off x="8389019" y="1618627"/>
+            <a:ext cx="0" cy="3651768"/>
           </a:xfrm>
           <a:prstGeom prst="line">
             <a:avLst/>
           </a:prstGeom>
+          <a:ln>
+            <a:solidFill>
+              <a:schemeClr val="accent2"/>
+            </a:solidFill>
+          </a:ln>
         </p:spPr>
         <p:style>
           <a:lnRef idx="1">
@@ -3584,13 +3611,18 @@
         </p:nvSpPr>
         <p:spPr>
           <a:xfrm>
-            <a:off x="3921987" y="1508916"/>
-            <a:ext cx="1183342" cy="338554"/>
+            <a:off x="7340838" y="1282486"/>
+            <a:ext cx="2096362" cy="338554"/>
           </a:xfrm>
           <a:prstGeom prst="rect">
             <a:avLst/>
           </a:prstGeom>
           <a:noFill/>
+          <a:ln>
+            <a:solidFill>
+              <a:schemeClr val="accent2"/>
+            </a:solidFill>
+          </a:ln>
         </p:spPr>
         <p:txBody>
           <a:bodyPr wrap="square" rtlCol="0">
@@ -3600,10 +3632,9 @@
           <a:p>
             <a:pPr algn="ctr"/>
             <a:r>
-              <a:rPr lang="en-US" sz="1600" dirty="0" err="1"/>
-              <a:t>ghe_fetch.js</a:t>
-            </a:r>
-            <a:endParaRPr lang="en-US" sz="1600" dirty="0"/>
+              <a:rPr lang="en-US" sz="1600" dirty="0"/>
+              <a:t>As3_service_action.js</a:t>
+            </a:r>
           </a:p>
         </p:txBody>
       </p:sp>
@@ -3623,7 +3654,7 @@
         </p:nvCxnSpPr>
         <p:spPr>
           <a:xfrm flipH="1">
-            <a:off x="753035" y="2683450"/>
+            <a:off x="2773468" y="3153715"/>
             <a:ext cx="3553610" cy="0"/>
           </a:xfrm>
           <a:prstGeom prst="straightConnector1">
@@ -3664,8 +3695,8 @@
         </p:nvCxnSpPr>
         <p:spPr>
           <a:xfrm>
-            <a:off x="3254241" y="2078307"/>
-            <a:ext cx="1052404" cy="0"/>
+            <a:off x="4898371" y="1930259"/>
+            <a:ext cx="3302893" cy="0"/>
           </a:xfrm>
           <a:prstGeom prst="straightConnector1">
             <a:avLst/>
@@ -3705,7 +3736,7 @@
         </p:nvCxnSpPr>
         <p:spPr>
           <a:xfrm>
-            <a:off x="753035" y="2824547"/>
+            <a:off x="2773468" y="3338357"/>
             <a:ext cx="3553610" cy="0"/>
           </a:xfrm>
           <a:prstGeom prst="straightConnector1">
@@ -3746,7 +3777,7 @@
         </p:nvCxnSpPr>
         <p:spPr>
           <a:xfrm flipH="1">
-            <a:off x="753035" y="3573635"/>
+            <a:off x="2773468" y="3704261"/>
             <a:ext cx="3553610" cy="0"/>
           </a:xfrm>
           <a:prstGeom prst="straightConnector1">
@@ -3787,7 +3818,7 @@
         </p:nvCxnSpPr>
         <p:spPr>
           <a:xfrm>
-            <a:off x="753035" y="3821062"/>
+            <a:off x="2773468" y="3899434"/>
             <a:ext cx="3553610" cy="0"/>
           </a:xfrm>
           <a:prstGeom prst="straightConnector1">
@@ -3826,8 +3857,8 @@
         </p:nvSpPr>
         <p:spPr>
           <a:xfrm>
-            <a:off x="1727948" y="2449808"/>
-            <a:ext cx="1638677" cy="276999"/>
+            <a:off x="3368125" y="2952943"/>
+            <a:ext cx="2399188" cy="261610"/>
           </a:xfrm>
           <a:prstGeom prst="rect">
             <a:avLst/>
@@ -3842,8 +3873,8 @@
           <a:p>
             <a:pPr algn="ctr"/>
             <a:r>
-              <a:rPr lang="en-US" sz="1200" dirty="0"/>
-              <a:t>Get attributes</a:t>
+              <a:rPr lang="en-US" sz="1100" dirty="0"/>
+              <a:t>Get committed object attributes</a:t>
             </a:r>
           </a:p>
         </p:txBody>
@@ -3862,8 +3893,8 @@
         </p:nvSpPr>
         <p:spPr>
           <a:xfrm>
-            <a:off x="929111" y="3352829"/>
-            <a:ext cx="3193320" cy="276999"/>
+            <a:off x="2949544" y="3483455"/>
+            <a:ext cx="3193320" cy="261610"/>
           </a:xfrm>
           <a:prstGeom prst="rect">
             <a:avLst/>
@@ -3878,15 +3909,15 @@
           <a:p>
             <a:pPr algn="ctr"/>
             <a:r>
-              <a:rPr lang="en-US" sz="1200" dirty="0"/>
+              <a:rPr lang="en-US" sz="1100" dirty="0"/>
               <a:t>Get Service Definition “</a:t>
             </a:r>
             <a:r>
-              <a:rPr lang="en-US" sz="1200" dirty="0" err="1"/>
+              <a:rPr lang="en-US" sz="1100" dirty="0" err="1"/>
               <a:t>download_url</a:t>
             </a:r>
             <a:r>
-              <a:rPr lang="en-US" sz="1200" dirty="0"/>
+              <a:rPr lang="en-US" sz="1100" dirty="0"/>
               <a:t>” attribute</a:t>
             </a:r>
           </a:p>
@@ -3894,10 +3925,10 @@
       </p:sp>
       <p:cxnSp>
         <p:nvCxnSpPr>
-          <p:cNvPr id="25" name="Straight Connector 24">
-            <a:extLst>
-              <a:ext uri="{FF2B5EF4-FFF2-40B4-BE49-F238E27FC236}">
-                <a16:creationId xmlns:a16="http://schemas.microsoft.com/office/drawing/2014/main" id="{B4F2B93D-8185-B64B-ABC6-F7238FF00200}"/>
+          <p:cNvPr id="36" name="Straight Connector 35">
+            <a:extLst>
+              <a:ext uri="{FF2B5EF4-FFF2-40B4-BE49-F238E27FC236}">
+                <a16:creationId xmlns:a16="http://schemas.microsoft.com/office/drawing/2014/main" id="{D419B020-A3A9-714B-9B34-069002EACFC0}"/>
               </a:ext>
             </a:extLst>
           </p:cNvPr>
@@ -3906,12 +3937,17 @@
         </p:nvCxnSpPr>
         <p:spPr>
           <a:xfrm>
-            <a:off x="7701918" y="3918328"/>
-            <a:ext cx="0" cy="656803"/>
+            <a:off x="10716482" y="4398191"/>
+            <a:ext cx="0" cy="2061327"/>
           </a:xfrm>
           <a:prstGeom prst="line">
             <a:avLst/>
           </a:prstGeom>
+          <a:ln>
+            <a:solidFill>
+              <a:schemeClr val="accent2"/>
+            </a:solidFill>
+          </a:ln>
         </p:spPr>
         <p:style>
           <a:lnRef idx="1">
@@ -3930,10 +3966,10 @@
       </p:cxnSp>
       <p:sp>
         <p:nvSpPr>
-          <p:cNvPr id="26" name="TextBox 25">
-            <a:extLst>
-              <a:ext uri="{FF2B5EF4-FFF2-40B4-BE49-F238E27FC236}">
-                <a16:creationId xmlns:a16="http://schemas.microsoft.com/office/drawing/2014/main" id="{37F53DFB-E9EE-9B4E-9E6C-10AEF311C9F5}"/>
+          <p:cNvPr id="37" name="TextBox 36">
+            <a:extLst>
+              <a:ext uri="{FF2B5EF4-FFF2-40B4-BE49-F238E27FC236}">
+                <a16:creationId xmlns:a16="http://schemas.microsoft.com/office/drawing/2014/main" id="{46B9B13C-77A9-7A46-89A8-510961F2F76F}"/>
               </a:ext>
             </a:extLst>
           </p:cNvPr>
@@ -3942,13 +3978,18 @@
         </p:nvSpPr>
         <p:spPr>
           <a:xfrm>
-            <a:off x="6984515" y="3567339"/>
-            <a:ext cx="1732531" cy="338554"/>
+            <a:off x="10349101" y="4068354"/>
+            <a:ext cx="734762" cy="338554"/>
           </a:xfrm>
           <a:prstGeom prst="rect">
             <a:avLst/>
           </a:prstGeom>
           <a:noFill/>
+          <a:ln>
+            <a:solidFill>
+              <a:schemeClr val="accent2"/>
+            </a:solidFill>
+          </a:ln>
         </p:spPr>
         <p:txBody>
           <a:bodyPr wrap="square" rtlCol="0">
@@ -3958,19 +3999,356 @@
           <a:p>
             <a:pPr algn="ctr"/>
             <a:r>
-              <a:rPr lang="en-US" sz="1600" dirty="0" err="1"/>
-              <a:t>service_deploy.js</a:t>
-            </a:r>
-            <a:endParaRPr lang="en-US" sz="1600" dirty="0"/>
+              <a:rPr lang="en-US" sz="1600" dirty="0"/>
+              <a:t>BIG-IP</a:t>
+            </a:r>
+          </a:p>
+        </p:txBody>
+      </p:sp>
+      <p:sp>
+        <p:nvSpPr>
+          <p:cNvPr id="43" name="TextBox 42">
+            <a:extLst>
+              <a:ext uri="{FF2B5EF4-FFF2-40B4-BE49-F238E27FC236}">
+                <a16:creationId xmlns:a16="http://schemas.microsoft.com/office/drawing/2014/main" id="{0D9B15E1-CAB1-BB4B-92A0-07CFB200A007}"/>
+              </a:ext>
+            </a:extLst>
+          </p:cNvPr>
+          <p:cNvSpPr txBox="1"/>
+          <p:nvPr/>
+        </p:nvSpPr>
+        <p:spPr>
+          <a:xfrm>
+            <a:off x="2907527" y="915184"/>
+            <a:ext cx="1638677" cy="430887"/>
+          </a:xfrm>
+          <a:prstGeom prst="rect">
+            <a:avLst/>
+          </a:prstGeom>
+          <a:noFill/>
+        </p:spPr>
+        <p:txBody>
+          <a:bodyPr wrap="square" rtlCol="0">
+            <a:spAutoFit/>
+          </a:bodyPr>
+          <a:lstStyle/>
+          <a:p>
+            <a:pPr algn="ctr"/>
+            <a:r>
+              <a:rPr lang="en-US" sz="1100" dirty="0" err="1"/>
+              <a:t>Webhook</a:t>
+            </a:r>
+            <a:r>
+              <a:rPr lang="en-US" sz="1100" dirty="0"/>
+              <a:t> ‘commit’ message</a:t>
+            </a:r>
+          </a:p>
+        </p:txBody>
+      </p:sp>
+      <p:sp>
+        <p:nvSpPr>
+          <p:cNvPr id="33" name="TextBox 32">
+            <a:extLst>
+              <a:ext uri="{FF2B5EF4-FFF2-40B4-BE49-F238E27FC236}">
+                <a16:creationId xmlns:a16="http://schemas.microsoft.com/office/drawing/2014/main" id="{57C89082-3E23-FC4A-AC52-C2AF8FB61BD7}"/>
+              </a:ext>
+            </a:extLst>
+          </p:cNvPr>
+          <p:cNvSpPr txBox="1"/>
+          <p:nvPr/>
+        </p:nvSpPr>
+        <p:spPr>
+          <a:xfrm>
+            <a:off x="3290200" y="1445114"/>
+            <a:ext cx="1638677" cy="430887"/>
+          </a:xfrm>
+          <a:prstGeom prst="rect">
+            <a:avLst/>
+          </a:prstGeom>
+          <a:noFill/>
+        </p:spPr>
+        <p:txBody>
+          <a:bodyPr wrap="square" rtlCol="0">
+            <a:spAutoFit/>
+          </a:bodyPr>
+          <a:lstStyle/>
+          <a:p>
+            <a:pPr algn="ctr"/>
+            <a:r>
+              <a:rPr lang="en-US" sz="1100" dirty="0"/>
+              <a:t>Inspect what</a:t>
+            </a:r>
+          </a:p>
+          <a:p>
+            <a:pPr algn="ctr"/>
+            <a:r>
+              <a:rPr lang="en-US" sz="1100" dirty="0"/>
+              <a:t>was ‘</a:t>
+            </a:r>
+            <a:r>
+              <a:rPr lang="en-US" sz="1100" dirty="0" err="1"/>
+              <a:t>commit’ed</a:t>
+            </a:r>
+            <a:endParaRPr lang="en-US" sz="1100" dirty="0"/>
+          </a:p>
+        </p:txBody>
+      </p:sp>
+      <p:sp>
+        <p:nvSpPr>
+          <p:cNvPr id="35" name="TextBox 34">
+            <a:extLst>
+              <a:ext uri="{FF2B5EF4-FFF2-40B4-BE49-F238E27FC236}">
+                <a16:creationId xmlns:a16="http://schemas.microsoft.com/office/drawing/2014/main" id="{1F8A2A5F-0338-F844-A394-BC9DED95FD6C}"/>
+              </a:ext>
+            </a:extLst>
+          </p:cNvPr>
+          <p:cNvSpPr txBox="1"/>
+          <p:nvPr/>
+        </p:nvSpPr>
+        <p:spPr>
+          <a:xfrm>
+            <a:off x="2971059" y="3691176"/>
+            <a:ext cx="3193320" cy="261610"/>
+          </a:xfrm>
+          <a:prstGeom prst="rect">
+            <a:avLst/>
+          </a:prstGeom>
+          <a:noFill/>
+        </p:spPr>
+        <p:txBody>
+          <a:bodyPr wrap="square" rtlCol="0">
+            <a:spAutoFit/>
+          </a:bodyPr>
+          <a:lstStyle/>
+          <a:p>
+            <a:pPr algn="ctr"/>
+            <a:r>
+              <a:rPr lang="en-US" sz="1100" dirty="0"/>
+              <a:t>Link to Service Definition.</a:t>
+            </a:r>
+          </a:p>
+        </p:txBody>
+      </p:sp>
+      <p:sp>
+        <p:nvSpPr>
+          <p:cNvPr id="44" name="Arc 43">
+            <a:extLst>
+              <a:ext uri="{FF2B5EF4-FFF2-40B4-BE49-F238E27FC236}">
+                <a16:creationId xmlns:a16="http://schemas.microsoft.com/office/drawing/2014/main" id="{00A9BEE5-CB1A-E249-AEBF-83150495425C}"/>
+              </a:ext>
+            </a:extLst>
+          </p:cNvPr>
+          <p:cNvSpPr/>
+          <p:nvPr/>
+        </p:nvSpPr>
+        <p:spPr>
+          <a:xfrm rot="13645426">
+            <a:off x="4552192" y="1272968"/>
+            <a:ext cx="365762" cy="365451"/>
+          </a:xfrm>
+          <a:prstGeom prst="arc">
+            <a:avLst>
+              <a:gd name="adj1" fmla="val 14217805"/>
+              <a:gd name="adj2" fmla="val 1742899"/>
+            </a:avLst>
+          </a:prstGeom>
+          <a:ln w="9525">
+            <a:headEnd type="triangle"/>
+            <a:tailEnd type="none"/>
+          </a:ln>
+        </p:spPr>
+        <p:style>
+          <a:lnRef idx="1">
+            <a:schemeClr val="accent1"/>
+          </a:lnRef>
+          <a:fillRef idx="0">
+            <a:schemeClr val="accent1"/>
+          </a:fillRef>
+          <a:effectRef idx="0">
+            <a:schemeClr val="accent1"/>
+          </a:effectRef>
+          <a:fontRef idx="minor">
+            <a:schemeClr val="tx1"/>
+          </a:fontRef>
+        </p:style>
+        <p:txBody>
+          <a:bodyPr rtlCol="0" anchor="ctr"/>
+          <a:lstStyle/>
+          <a:p>
+            <a:pPr algn="ctr"/>
+            <a:endParaRPr lang="en-US"/>
+          </a:p>
+        </p:txBody>
+      </p:sp>
+      <p:sp>
+        <p:nvSpPr>
+          <p:cNvPr id="47" name="TextBox 46">
+            <a:extLst>
+              <a:ext uri="{FF2B5EF4-FFF2-40B4-BE49-F238E27FC236}">
+                <a16:creationId xmlns:a16="http://schemas.microsoft.com/office/drawing/2014/main" id="{4D5B0CBB-9798-FF4C-BD3B-0581B6CE939F}"/>
+              </a:ext>
+            </a:extLst>
+          </p:cNvPr>
+          <p:cNvSpPr txBox="1"/>
+          <p:nvPr/>
+        </p:nvSpPr>
+        <p:spPr>
+          <a:xfrm>
+            <a:off x="5350116" y="1718630"/>
+            <a:ext cx="2399188" cy="430887"/>
+          </a:xfrm>
+          <a:prstGeom prst="rect">
+            <a:avLst/>
+          </a:prstGeom>
+          <a:noFill/>
+        </p:spPr>
+        <p:txBody>
+          <a:bodyPr wrap="square" rtlCol="0">
+            <a:spAutoFit/>
+          </a:bodyPr>
+          <a:lstStyle/>
+          <a:p>
+            <a:pPr algn="ctr"/>
+            <a:r>
+              <a:rPr lang="en-US" sz="1100" dirty="0"/>
+              <a:t>If it’s an [</a:t>
+            </a:r>
+            <a:r>
+              <a:rPr lang="en-US" sz="1100" dirty="0" err="1"/>
+              <a:t>added|modified|deleted</a:t>
+            </a:r>
+            <a:r>
+              <a:rPr lang="en-US" sz="1100" dirty="0"/>
+              <a:t>] Service Definition</a:t>
+            </a:r>
+          </a:p>
+        </p:txBody>
+      </p:sp>
+      <p:sp>
+        <p:nvSpPr>
+          <p:cNvPr id="49" name="TextBox 48">
+            <a:extLst>
+              <a:ext uri="{FF2B5EF4-FFF2-40B4-BE49-F238E27FC236}">
+                <a16:creationId xmlns:a16="http://schemas.microsoft.com/office/drawing/2014/main" id="{4A965560-9EDF-6B49-A913-E49415E0A5AB}"/>
+              </a:ext>
+            </a:extLst>
+          </p:cNvPr>
+          <p:cNvSpPr txBox="1"/>
+          <p:nvPr/>
+        </p:nvSpPr>
+        <p:spPr>
+          <a:xfrm>
+            <a:off x="3563253" y="3131470"/>
+            <a:ext cx="1982800" cy="261610"/>
+          </a:xfrm>
+          <a:prstGeom prst="rect">
+            <a:avLst/>
+          </a:prstGeom>
+          <a:noFill/>
+        </p:spPr>
+        <p:txBody>
+          <a:bodyPr wrap="square" rtlCol="0">
+            <a:spAutoFit/>
+          </a:bodyPr>
+          <a:lstStyle/>
+          <a:p>
+            <a:pPr algn="ctr"/>
+            <a:r>
+              <a:rPr lang="en-US" sz="1100" dirty="0"/>
+              <a:t>Commit data</a:t>
+            </a:r>
           </a:p>
         </p:txBody>
       </p:sp>
       <p:cxnSp>
         <p:nvCxnSpPr>
-          <p:cNvPr id="27" name="Straight Arrow Connector 26">
-            <a:extLst>
-              <a:ext uri="{FF2B5EF4-FFF2-40B4-BE49-F238E27FC236}">
-                <a16:creationId xmlns:a16="http://schemas.microsoft.com/office/drawing/2014/main" id="{3F10BBF3-6121-BF46-BBEC-53DF31487FEF}"/>
+          <p:cNvPr id="50" name="Straight Connector 49">
+            <a:extLst>
+              <a:ext uri="{FF2B5EF4-FFF2-40B4-BE49-F238E27FC236}">
+                <a16:creationId xmlns:a16="http://schemas.microsoft.com/office/drawing/2014/main" id="{F9E6B0BC-2590-7F4F-A181-3FF3584BEB3F}"/>
+              </a:ext>
+            </a:extLst>
+          </p:cNvPr>
+          <p:cNvCxnSpPr/>
+          <p:nvPr/>
+        </p:nvCxnSpPr>
+        <p:spPr>
+          <a:xfrm>
+            <a:off x="6476494" y="2806567"/>
+            <a:ext cx="0" cy="2061327"/>
+          </a:xfrm>
+          <a:prstGeom prst="line">
+            <a:avLst/>
+          </a:prstGeom>
+          <a:ln>
+            <a:solidFill>
+              <a:schemeClr val="accent2"/>
+            </a:solidFill>
+          </a:ln>
+        </p:spPr>
+        <p:style>
+          <a:lnRef idx="1">
+            <a:schemeClr val="accent1"/>
+          </a:lnRef>
+          <a:fillRef idx="0">
+            <a:schemeClr val="accent1"/>
+          </a:fillRef>
+          <a:effectRef idx="0">
+            <a:schemeClr val="accent1"/>
+          </a:effectRef>
+          <a:fontRef idx="minor">
+            <a:schemeClr val="tx1"/>
+          </a:fontRef>
+        </p:style>
+      </p:cxnSp>
+      <p:sp>
+        <p:nvSpPr>
+          <p:cNvPr id="51" name="TextBox 50">
+            <a:extLst>
+              <a:ext uri="{FF2B5EF4-FFF2-40B4-BE49-F238E27FC236}">
+                <a16:creationId xmlns:a16="http://schemas.microsoft.com/office/drawing/2014/main" id="{9A11C3EE-248B-4F49-9F2D-023AEBB22F7C}"/>
+              </a:ext>
+            </a:extLst>
+          </p:cNvPr>
+          <p:cNvSpPr txBox="1"/>
+          <p:nvPr/>
+        </p:nvSpPr>
+        <p:spPr>
+          <a:xfrm>
+            <a:off x="5834364" y="2445173"/>
+            <a:ext cx="1301676" cy="338554"/>
+          </a:xfrm>
+          <a:prstGeom prst="rect">
+            <a:avLst/>
+          </a:prstGeom>
+          <a:noFill/>
+          <a:ln>
+            <a:solidFill>
+              <a:schemeClr val="accent2"/>
+            </a:solidFill>
+          </a:ln>
+        </p:spPr>
+        <p:txBody>
+          <a:bodyPr wrap="square" rtlCol="0">
+            <a:spAutoFit/>
+          </a:bodyPr>
+          <a:lstStyle/>
+          <a:p>
+            <a:pPr algn="ctr"/>
+            <a:r>
+              <a:rPr lang="en-US" sz="1600" dirty="0" err="1"/>
+              <a:t>ghe-fetch.js</a:t>
+            </a:r>
+            <a:endParaRPr lang="en-US" sz="1600" dirty="0"/>
+          </a:p>
+        </p:txBody>
+      </p:sp>
+      <p:cxnSp>
+        <p:nvCxnSpPr>
+          <p:cNvPr id="52" name="Straight Arrow Connector 51">
+            <a:extLst>
+              <a:ext uri="{FF2B5EF4-FFF2-40B4-BE49-F238E27FC236}">
+                <a16:creationId xmlns:a16="http://schemas.microsoft.com/office/drawing/2014/main" id="{5BEF06AC-C1EB-4F43-A901-A4AA09319A86}"/>
               </a:ext>
             </a:extLst>
           </p:cNvPr>
@@ -3980,9 +4358,93 @@
           <p:nvPr/>
         </p:nvCxnSpPr>
         <p:spPr>
-          <a:xfrm>
-            <a:off x="4729648" y="4089229"/>
-            <a:ext cx="2729664" cy="0"/>
+          <a:xfrm flipH="1">
+            <a:off x="6603587" y="3002143"/>
+            <a:ext cx="1657786" cy="0"/>
+          </a:xfrm>
+          <a:prstGeom prst="straightConnector1">
+            <a:avLst/>
+          </a:prstGeom>
+          <a:ln>
+            <a:tailEnd type="triangle"/>
+          </a:ln>
+        </p:spPr>
+        <p:style>
+          <a:lnRef idx="1">
+            <a:schemeClr val="accent1"/>
+          </a:lnRef>
+          <a:fillRef idx="0">
+            <a:schemeClr val="accent1"/>
+          </a:fillRef>
+          <a:effectRef idx="0">
+            <a:schemeClr val="accent1"/>
+          </a:effectRef>
+          <a:fontRef idx="minor">
+            <a:schemeClr val="tx1"/>
+          </a:fontRef>
+        </p:style>
+      </p:cxnSp>
+      <p:sp>
+        <p:nvSpPr>
+          <p:cNvPr id="53" name="TextBox 52">
+            <a:extLst>
+              <a:ext uri="{FF2B5EF4-FFF2-40B4-BE49-F238E27FC236}">
+                <a16:creationId xmlns:a16="http://schemas.microsoft.com/office/drawing/2014/main" id="{A205E636-25FA-B14F-8275-65490812D53C}"/>
+              </a:ext>
+            </a:extLst>
+          </p:cNvPr>
+          <p:cNvSpPr txBox="1"/>
+          <p:nvPr/>
+        </p:nvSpPr>
+        <p:spPr>
+          <a:xfrm>
+            <a:off x="6705073" y="2801371"/>
+            <a:ext cx="1489706" cy="430887"/>
+          </a:xfrm>
+          <a:prstGeom prst="rect">
+            <a:avLst/>
+          </a:prstGeom>
+          <a:noFill/>
+        </p:spPr>
+        <p:txBody>
+          <a:bodyPr wrap="square" rtlCol="0">
+            <a:spAutoFit/>
+          </a:bodyPr>
+          <a:lstStyle/>
+          <a:p>
+            <a:pPr algn="ctr"/>
+            <a:r>
+              <a:rPr lang="en-US" sz="1100" dirty="0"/>
+              <a:t>Get me the</a:t>
+            </a:r>
+            <a:br>
+              <a:rPr lang="en-US" sz="1100" dirty="0"/>
+            </a:br>
+            <a:r>
+              <a:rPr lang="en-US" sz="1100" dirty="0"/>
+              <a:t>Service Definition</a:t>
+            </a:r>
+          </a:p>
+        </p:txBody>
+      </p:sp>
+      <p:cxnSp>
+        <p:nvCxnSpPr>
+          <p:cNvPr id="54" name="Straight Arrow Connector 53">
+            <a:extLst>
+              <a:ext uri="{FF2B5EF4-FFF2-40B4-BE49-F238E27FC236}">
+                <a16:creationId xmlns:a16="http://schemas.microsoft.com/office/drawing/2014/main" id="{4C6D8CAF-5B59-2945-A8F5-EEEFA3D80436}"/>
+              </a:ext>
+            </a:extLst>
+          </p:cNvPr>
+          <p:cNvCxnSpPr>
+            <a:cxnSpLocks/>
+          </p:cNvCxnSpPr>
+          <p:nvPr/>
+        </p:nvCxnSpPr>
+        <p:spPr>
+          <a:xfrm flipH="1">
+            <a:off x="2760403" y="4257259"/>
+            <a:ext cx="3553610" cy="0"/>
           </a:xfrm>
           <a:prstGeom prst="straightConnector1">
             <a:avLst/>
@@ -4008,24 +4470,29 @@
       </p:cxnSp>
       <p:cxnSp>
         <p:nvCxnSpPr>
-          <p:cNvPr id="28" name="Straight Connector 27">
-            <a:extLst>
-              <a:ext uri="{FF2B5EF4-FFF2-40B4-BE49-F238E27FC236}">
-                <a16:creationId xmlns:a16="http://schemas.microsoft.com/office/drawing/2014/main" id="{29C8DC38-DBBB-4040-A379-0694BC026B8E}"/>
-              </a:ext>
-            </a:extLst>
-          </p:cNvPr>
-          <p:cNvCxnSpPr/>
+          <p:cNvPr id="55" name="Straight Arrow Connector 54">
+            <a:extLst>
+              <a:ext uri="{FF2B5EF4-FFF2-40B4-BE49-F238E27FC236}">
+                <a16:creationId xmlns:a16="http://schemas.microsoft.com/office/drawing/2014/main" id="{B857A8AC-1114-C143-88AB-F3F4BD6BF605}"/>
+              </a:ext>
+            </a:extLst>
+          </p:cNvPr>
+          <p:cNvCxnSpPr>
+            <a:cxnSpLocks/>
+          </p:cNvCxnSpPr>
           <p:nvPr/>
         </p:nvCxnSpPr>
         <p:spPr>
           <a:xfrm>
-            <a:off x="7701918" y="5038916"/>
-            <a:ext cx="0" cy="656803"/>
-          </a:xfrm>
-          <a:prstGeom prst="line">
-            <a:avLst/>
-          </a:prstGeom>
+            <a:off x="2760403" y="4452432"/>
+            <a:ext cx="3553610" cy="0"/>
+          </a:xfrm>
+          <a:prstGeom prst="straightConnector1">
+            <a:avLst/>
+          </a:prstGeom>
+          <a:ln>
+            <a:tailEnd type="triangle"/>
+          </a:ln>
         </p:spPr>
         <p:style>
           <a:lnRef idx="1">
@@ -4044,10 +4511,10 @@
       </p:cxnSp>
       <p:sp>
         <p:nvSpPr>
-          <p:cNvPr id="29" name="TextBox 28">
-            <a:extLst>
-              <a:ext uri="{FF2B5EF4-FFF2-40B4-BE49-F238E27FC236}">
-                <a16:creationId xmlns:a16="http://schemas.microsoft.com/office/drawing/2014/main" id="{451C5DCF-866B-A041-A252-EE89440874CB}"/>
+          <p:cNvPr id="56" name="TextBox 55">
+            <a:extLst>
+              <a:ext uri="{FF2B5EF4-FFF2-40B4-BE49-F238E27FC236}">
+                <a16:creationId xmlns:a16="http://schemas.microsoft.com/office/drawing/2014/main" id="{80A8671F-BE5C-B041-BA5D-F86ACAF1618F}"/>
               </a:ext>
             </a:extLst>
           </p:cNvPr>
@@ -4056,8 +4523,8 @@
         </p:nvSpPr>
         <p:spPr>
           <a:xfrm>
-            <a:off x="6865989" y="4624129"/>
-            <a:ext cx="1905784" cy="338554"/>
+            <a:off x="2936479" y="4036453"/>
+            <a:ext cx="3193320" cy="261610"/>
           </a:xfrm>
           <a:prstGeom prst="rect">
             <a:avLst/>
@@ -4072,19 +4539,54 @@
           <a:p>
             <a:pPr algn="ctr"/>
             <a:r>
-              <a:rPr lang="en-US" sz="1600" dirty="0" err="1"/>
-              <a:t>service_redeploy.js</a:t>
-            </a:r>
-            <a:endParaRPr lang="en-US" sz="1600" dirty="0"/>
+              <a:rPr lang="en-US" sz="1100" dirty="0"/>
+              <a:t>Get the actual Service Definition</a:t>
+            </a:r>
+          </a:p>
+        </p:txBody>
+      </p:sp>
+      <p:sp>
+        <p:nvSpPr>
+          <p:cNvPr id="57" name="TextBox 56">
+            <a:extLst>
+              <a:ext uri="{FF2B5EF4-FFF2-40B4-BE49-F238E27FC236}">
+                <a16:creationId xmlns:a16="http://schemas.microsoft.com/office/drawing/2014/main" id="{218A1982-E53E-9E48-B769-83A4EBCCAF0E}"/>
+              </a:ext>
+            </a:extLst>
+          </p:cNvPr>
+          <p:cNvSpPr txBox="1"/>
+          <p:nvPr/>
+        </p:nvSpPr>
+        <p:spPr>
+          <a:xfrm>
+            <a:off x="3939073" y="4244174"/>
+            <a:ext cx="1231162" cy="261610"/>
+          </a:xfrm>
+          <a:prstGeom prst="rect">
+            <a:avLst/>
+          </a:prstGeom>
+          <a:noFill/>
+        </p:spPr>
+        <p:txBody>
+          <a:bodyPr wrap="square" rtlCol="0">
+            <a:spAutoFit/>
+          </a:bodyPr>
+          <a:lstStyle/>
+          <a:p>
+            <a:pPr algn="ctr"/>
+            <a:r>
+              <a:rPr lang="en-US" sz="1100" dirty="0"/>
+              <a:t>Service Definition</a:t>
+            </a:r>
           </a:p>
         </p:txBody>
       </p:sp>
       <p:cxnSp>
         <p:nvCxnSpPr>
-          <p:cNvPr id="30" name="Straight Connector 29">
-            <a:extLst>
-              <a:ext uri="{FF2B5EF4-FFF2-40B4-BE49-F238E27FC236}">
-                <a16:creationId xmlns:a16="http://schemas.microsoft.com/office/drawing/2014/main" id="{E884FC4D-3A99-064C-AE30-F75C1F42AD01}"/>
+          <p:cNvPr id="58" name="Straight Arrow Connector 57">
+            <a:extLst>
+              <a:ext uri="{FF2B5EF4-FFF2-40B4-BE49-F238E27FC236}">
+                <a16:creationId xmlns:a16="http://schemas.microsoft.com/office/drawing/2014/main" id="{FD55D570-A526-374D-9471-DA79A53E5083}"/>
               </a:ext>
             </a:extLst>
           </p:cNvPr>
@@ -4093,12 +4595,15 @@
         </p:nvCxnSpPr>
         <p:spPr>
           <a:xfrm>
-            <a:off x="7707015" y="6042605"/>
-            <a:ext cx="0" cy="656803"/>
-          </a:xfrm>
-          <a:prstGeom prst="line">
-            <a:avLst/>
-          </a:prstGeom>
+            <a:off x="6581125" y="4671949"/>
+            <a:ext cx="1705383" cy="0"/>
+          </a:xfrm>
+          <a:prstGeom prst="straightConnector1">
+            <a:avLst/>
+          </a:prstGeom>
+          <a:ln>
+            <a:tailEnd type="triangle"/>
+          </a:ln>
         </p:spPr>
         <p:style>
           <a:lnRef idx="1">
@@ -4117,10 +4622,10 @@
       </p:cxnSp>
       <p:sp>
         <p:nvSpPr>
-          <p:cNvPr id="31" name="TextBox 30">
-            <a:extLst>
-              <a:ext uri="{FF2B5EF4-FFF2-40B4-BE49-F238E27FC236}">
-                <a16:creationId xmlns:a16="http://schemas.microsoft.com/office/drawing/2014/main" id="{A0F756BF-A818-A64B-B329-EE5F5ADAB65C}"/>
+          <p:cNvPr id="59" name="TextBox 58">
+            <a:extLst>
+              <a:ext uri="{FF2B5EF4-FFF2-40B4-BE49-F238E27FC236}">
+                <a16:creationId xmlns:a16="http://schemas.microsoft.com/office/drawing/2014/main" id="{5BED364A-0E26-C742-B3E7-F538B6D62AC0}"/>
               </a:ext>
             </a:extLst>
           </p:cNvPr>
@@ -4129,8 +4634,8 @@
         </p:nvSpPr>
         <p:spPr>
           <a:xfrm>
-            <a:off x="6849820" y="5638451"/>
-            <a:ext cx="1905784" cy="338554"/>
+            <a:off x="6653222" y="4443255"/>
+            <a:ext cx="1638677" cy="261610"/>
           </a:xfrm>
           <a:prstGeom prst="rect">
             <a:avLst/>
@@ -4145,31 +4650,28 @@
           <a:p>
             <a:pPr algn="ctr"/>
             <a:r>
-              <a:rPr lang="en-US" sz="1600" dirty="0" err="1"/>
-              <a:t>service_delete.js</a:t>
-            </a:r>
-            <a:endParaRPr lang="en-US" sz="1600" dirty="0"/>
+              <a:rPr lang="en-US" sz="1100" dirty="0"/>
+              <a:t>Service Definition, sir!</a:t>
+            </a:r>
           </a:p>
         </p:txBody>
       </p:sp>
       <p:cxnSp>
         <p:nvCxnSpPr>
-          <p:cNvPr id="32" name="Straight Arrow Connector 31">
-            <a:extLst>
-              <a:ext uri="{FF2B5EF4-FFF2-40B4-BE49-F238E27FC236}">
-                <a16:creationId xmlns:a16="http://schemas.microsoft.com/office/drawing/2014/main" id="{3C9EA888-2AD0-DF44-A675-1ADFD2F5D09B}"/>
-              </a:ext>
-            </a:extLst>
-          </p:cNvPr>
-          <p:cNvCxnSpPr>
-            <a:cxnSpLocks/>
-          </p:cNvCxnSpPr>
+          <p:cNvPr id="60" name="Straight Arrow Connector 59">
+            <a:extLst>
+              <a:ext uri="{FF2B5EF4-FFF2-40B4-BE49-F238E27FC236}">
+                <a16:creationId xmlns:a16="http://schemas.microsoft.com/office/drawing/2014/main" id="{0C947402-A573-FC44-968D-C9AF1DA559FB}"/>
+              </a:ext>
+            </a:extLst>
+          </p:cNvPr>
+          <p:cNvCxnSpPr/>
           <p:nvPr/>
         </p:nvCxnSpPr>
         <p:spPr>
           <a:xfrm>
-            <a:off x="4731440" y="4241629"/>
-            <a:ext cx="2727872" cy="1125688"/>
+            <a:off x="8501315" y="4965783"/>
+            <a:ext cx="1705383" cy="0"/>
           </a:xfrm>
           <a:prstGeom prst="straightConnector1">
             <a:avLst/>
@@ -4193,12 +4695,63 @@
           </a:fontRef>
         </p:style>
       </p:cxnSp>
+      <p:sp>
+        <p:nvSpPr>
+          <p:cNvPr id="61" name="TextBox 60">
+            <a:extLst>
+              <a:ext uri="{FF2B5EF4-FFF2-40B4-BE49-F238E27FC236}">
+                <a16:creationId xmlns:a16="http://schemas.microsoft.com/office/drawing/2014/main" id="{671D197B-7D59-FB42-BDFB-5BD04EA6E4E1}"/>
+              </a:ext>
+            </a:extLst>
+          </p:cNvPr>
+          <p:cNvSpPr txBox="1"/>
+          <p:nvPr/>
+        </p:nvSpPr>
+        <p:spPr>
+          <a:xfrm>
+            <a:off x="8573412" y="4754507"/>
+            <a:ext cx="1638677" cy="430887"/>
+          </a:xfrm>
+          <a:prstGeom prst="rect">
+            <a:avLst/>
+          </a:prstGeom>
+          <a:noFill/>
+        </p:spPr>
+        <p:txBody>
+          <a:bodyPr wrap="square" rtlCol="0">
+            <a:spAutoFit/>
+          </a:bodyPr>
+          <a:lstStyle/>
+          <a:p>
+            <a:pPr algn="ctr"/>
+            <a:r>
+              <a:rPr lang="en-US" sz="1100" dirty="0"/>
+              <a:t>Be more like this!!!</a:t>
+            </a:r>
+          </a:p>
+          <a:p>
+            <a:pPr algn="ctr"/>
+            <a:r>
+              <a:rPr lang="en-US" sz="1100" dirty="0"/>
+              <a:t>[</a:t>
+            </a:r>
+            <a:r>
+              <a:rPr lang="en-US" sz="1100" dirty="0" err="1"/>
+              <a:t>add|modify|delete</a:t>
+            </a:r>
+            <a:r>
+              <a:rPr lang="en-US" sz="1100" dirty="0"/>
+              <a:t>]</a:t>
+            </a:r>
+          </a:p>
+        </p:txBody>
+      </p:sp>
       <p:cxnSp>
         <p:nvCxnSpPr>
-          <p:cNvPr id="34" name="Straight Arrow Connector 33">
-            <a:extLst>
-              <a:ext uri="{FF2B5EF4-FFF2-40B4-BE49-F238E27FC236}">
-                <a16:creationId xmlns:a16="http://schemas.microsoft.com/office/drawing/2014/main" id="{D753B3C6-B973-2643-89D3-8264EDB38846}"/>
+          <p:cNvPr id="62" name="Straight Arrow Connector 61">
+            <a:extLst>
+              <a:ext uri="{FF2B5EF4-FFF2-40B4-BE49-F238E27FC236}">
+                <a16:creationId xmlns:a16="http://schemas.microsoft.com/office/drawing/2014/main" id="{128F268D-0688-F946-BC49-C94BA1E0A45B}"/>
               </a:ext>
             </a:extLst>
           </p:cNvPr>
@@ -4208,9 +4761,9 @@
           <p:nvPr/>
         </p:nvCxnSpPr>
         <p:spPr>
-          <a:xfrm>
-            <a:off x="4756265" y="4458720"/>
-            <a:ext cx="2703047" cy="2049658"/>
+          <a:xfrm flipH="1">
+            <a:off x="6655247" y="5781778"/>
+            <a:ext cx="3553613" cy="0"/>
           </a:xfrm>
           <a:prstGeom prst="straightConnector1">
             <a:avLst/>
@@ -4234,12 +4787,48 @@
           </a:fontRef>
         </p:style>
       </p:cxnSp>
+      <p:sp>
+        <p:nvSpPr>
+          <p:cNvPr id="63" name="TextBox 62">
+            <a:extLst>
+              <a:ext uri="{FF2B5EF4-FFF2-40B4-BE49-F238E27FC236}">
+                <a16:creationId xmlns:a16="http://schemas.microsoft.com/office/drawing/2014/main" id="{8E8D439F-C421-9447-A12A-B5C17900CB0F}"/>
+              </a:ext>
+            </a:extLst>
+          </p:cNvPr>
+          <p:cNvSpPr txBox="1"/>
+          <p:nvPr/>
+        </p:nvSpPr>
+        <p:spPr>
+          <a:xfrm>
+            <a:off x="7644166" y="5546670"/>
+            <a:ext cx="1489706" cy="261610"/>
+          </a:xfrm>
+          <a:prstGeom prst="rect">
+            <a:avLst/>
+          </a:prstGeom>
+          <a:noFill/>
+        </p:spPr>
+        <p:txBody>
+          <a:bodyPr wrap="square" rtlCol="0">
+            <a:spAutoFit/>
+          </a:bodyPr>
+          <a:lstStyle/>
+          <a:p>
+            <a:pPr algn="ctr"/>
+            <a:r>
+              <a:rPr lang="en-US" sz="1100" dirty="0"/>
+              <a:t>Success/Fail</a:t>
+            </a:r>
+          </a:p>
+        </p:txBody>
+      </p:sp>
       <p:cxnSp>
         <p:nvCxnSpPr>
-          <p:cNvPr id="36" name="Straight Connector 35">
-            <a:extLst>
-              <a:ext uri="{FF2B5EF4-FFF2-40B4-BE49-F238E27FC236}">
-                <a16:creationId xmlns:a16="http://schemas.microsoft.com/office/drawing/2014/main" id="{D419B020-A3A9-714B-9B34-069002EACFC0}"/>
+          <p:cNvPr id="64" name="Straight Connector 63">
+            <a:extLst>
+              <a:ext uri="{FF2B5EF4-FFF2-40B4-BE49-F238E27FC236}">
+                <a16:creationId xmlns:a16="http://schemas.microsoft.com/office/drawing/2014/main" id="{E4FF97A0-D7AB-4E45-A52D-55B05A1A420C}"/>
               </a:ext>
             </a:extLst>
           </p:cNvPr>
@@ -4248,12 +4837,17 @@
         </p:nvCxnSpPr>
         <p:spPr>
           <a:xfrm>
-            <a:off x="10403876" y="4754539"/>
-            <a:ext cx="0" cy="1279922"/>
+            <a:off x="6442768" y="5464314"/>
+            <a:ext cx="0" cy="961624"/>
           </a:xfrm>
           <a:prstGeom prst="line">
             <a:avLst/>
           </a:prstGeom>
+          <a:ln>
+            <a:solidFill>
+              <a:schemeClr val="accent2"/>
+            </a:solidFill>
+          </a:ln>
         </p:spPr>
         <p:style>
           <a:lnRef idx="1">
@@ -4272,10 +4866,10 @@
       </p:cxnSp>
       <p:sp>
         <p:nvSpPr>
-          <p:cNvPr id="37" name="TextBox 36">
-            <a:extLst>
-              <a:ext uri="{FF2B5EF4-FFF2-40B4-BE49-F238E27FC236}">
-                <a16:creationId xmlns:a16="http://schemas.microsoft.com/office/drawing/2014/main" id="{46B9B13C-77A9-7A46-89A8-510961F2F76F}"/>
+          <p:cNvPr id="65" name="TextBox 64">
+            <a:extLst>
+              <a:ext uri="{FF2B5EF4-FFF2-40B4-BE49-F238E27FC236}">
+                <a16:creationId xmlns:a16="http://schemas.microsoft.com/office/drawing/2014/main" id="{2F64BA80-F22E-3F42-A6E1-F4AD1136E50F}"/>
               </a:ext>
             </a:extLst>
           </p:cNvPr>
@@ -4284,13 +4878,18 @@
         </p:nvSpPr>
         <p:spPr>
           <a:xfrm>
-            <a:off x="10036495" y="4446042"/>
-            <a:ext cx="734762" cy="338554"/>
+            <a:off x="5859805" y="5110432"/>
+            <a:ext cx="1183342" cy="338554"/>
           </a:xfrm>
           <a:prstGeom prst="rect">
             <a:avLst/>
           </a:prstGeom>
           <a:noFill/>
+          <a:ln>
+            <a:solidFill>
+              <a:schemeClr val="accent2"/>
+            </a:solidFill>
+          </a:ln>
         </p:spPr>
         <p:txBody>
           <a:bodyPr wrap="square" rtlCol="0">
@@ -4300,18 +4899,19 @@
           <a:p>
             <a:pPr algn="ctr"/>
             <a:r>
-              <a:rPr lang="en-US" sz="1600" dirty="0"/>
-              <a:t>BIG-IP</a:t>
-            </a:r>
+              <a:rPr lang="en-US" sz="1600" dirty="0" err="1"/>
+              <a:t>ghe-post.js</a:t>
+            </a:r>
+            <a:endParaRPr lang="en-US" sz="1600" dirty="0"/>
           </a:p>
         </p:txBody>
       </p:sp>
       <p:cxnSp>
         <p:nvCxnSpPr>
-          <p:cNvPr id="38" name="Straight Arrow Connector 37">
-            <a:extLst>
-              <a:ext uri="{FF2B5EF4-FFF2-40B4-BE49-F238E27FC236}">
-                <a16:creationId xmlns:a16="http://schemas.microsoft.com/office/drawing/2014/main" id="{6DB8F3C3-DE55-744D-8380-B42B6B8FB3CC}"/>
+          <p:cNvPr id="66" name="Straight Arrow Connector 65">
+            <a:extLst>
+              <a:ext uri="{FF2B5EF4-FFF2-40B4-BE49-F238E27FC236}">
+                <a16:creationId xmlns:a16="http://schemas.microsoft.com/office/drawing/2014/main" id="{43782A99-7C9D-B743-9064-B22AA532449F}"/>
               </a:ext>
             </a:extLst>
           </p:cNvPr>
@@ -4321,9 +4921,9 @@
           <p:nvPr/>
         </p:nvCxnSpPr>
         <p:spPr>
-          <a:xfrm>
-            <a:off x="7937419" y="5367317"/>
-            <a:ext cx="2255921" cy="0"/>
+          <a:xfrm flipH="1">
+            <a:off x="2745002" y="5750553"/>
+            <a:ext cx="3553613" cy="0"/>
           </a:xfrm>
           <a:prstGeom prst="straightConnector1">
             <a:avLst/>
@@ -4347,12 +4947,48 @@
           </a:fontRef>
         </p:style>
       </p:cxnSp>
+      <p:sp>
+        <p:nvSpPr>
+          <p:cNvPr id="67" name="TextBox 66">
+            <a:extLst>
+              <a:ext uri="{FF2B5EF4-FFF2-40B4-BE49-F238E27FC236}">
+                <a16:creationId xmlns:a16="http://schemas.microsoft.com/office/drawing/2014/main" id="{9378AD92-4FB6-7C45-9696-42A8A41206DA}"/>
+              </a:ext>
+            </a:extLst>
+          </p:cNvPr>
+          <p:cNvSpPr txBox="1"/>
+          <p:nvPr/>
+        </p:nvSpPr>
+        <p:spPr>
+          <a:xfrm>
+            <a:off x="3733921" y="5515445"/>
+            <a:ext cx="1489706" cy="261610"/>
+          </a:xfrm>
+          <a:prstGeom prst="rect">
+            <a:avLst/>
+          </a:prstGeom>
+          <a:noFill/>
+        </p:spPr>
+        <p:txBody>
+          <a:bodyPr wrap="square" rtlCol="0">
+            <a:spAutoFit/>
+          </a:bodyPr>
+          <a:lstStyle/>
+          <a:p>
+            <a:pPr algn="ctr"/>
+            <a:r>
+              <a:rPr lang="en-US" sz="1100" dirty="0"/>
+              <a:t>Success/Fail</a:t>
+            </a:r>
+          </a:p>
+        </p:txBody>
+      </p:sp>
       <p:cxnSp>
         <p:nvCxnSpPr>
-          <p:cNvPr id="39" name="Straight Arrow Connector 38">
-            <a:extLst>
-              <a:ext uri="{FF2B5EF4-FFF2-40B4-BE49-F238E27FC236}">
-                <a16:creationId xmlns:a16="http://schemas.microsoft.com/office/drawing/2014/main" id="{8AB87FC1-1D88-654D-BA14-432C9A0F1025}"/>
+          <p:cNvPr id="70" name="Straight Arrow Connector 69">
+            <a:extLst>
+              <a:ext uri="{FF2B5EF4-FFF2-40B4-BE49-F238E27FC236}">
+                <a16:creationId xmlns:a16="http://schemas.microsoft.com/office/drawing/2014/main" id="{50F7B1EA-F9DF-2C4F-904A-0ED835F2492A}"/>
               </a:ext>
             </a:extLst>
           </p:cNvPr>
@@ -4362,9 +4998,9 @@
           <p:nvPr/>
         </p:nvCxnSpPr>
         <p:spPr>
-          <a:xfrm flipV="1">
-            <a:off x="7937419" y="5695719"/>
-            <a:ext cx="2255921" cy="812659"/>
+          <a:xfrm flipH="1">
+            <a:off x="6650354" y="6198117"/>
+            <a:ext cx="3553613" cy="0"/>
           </a:xfrm>
           <a:prstGeom prst="straightConnector1">
             <a:avLst/>
@@ -4388,12 +5024,55 @@
           </a:fontRef>
         </p:style>
       </p:cxnSp>
+      <p:sp>
+        <p:nvSpPr>
+          <p:cNvPr id="71" name="TextBox 70">
+            <a:extLst>
+              <a:ext uri="{FF2B5EF4-FFF2-40B4-BE49-F238E27FC236}">
+                <a16:creationId xmlns:a16="http://schemas.microsoft.com/office/drawing/2014/main" id="{DAE8609E-291C-EA4C-B35F-864FC4B68EC0}"/>
+              </a:ext>
+            </a:extLst>
+          </p:cNvPr>
+          <p:cNvSpPr txBox="1"/>
+          <p:nvPr/>
+        </p:nvSpPr>
+        <p:spPr>
+          <a:xfrm>
+            <a:off x="7639273" y="5989136"/>
+            <a:ext cx="1489706" cy="430887"/>
+          </a:xfrm>
+          <a:prstGeom prst="rect">
+            <a:avLst/>
+          </a:prstGeom>
+          <a:noFill/>
+        </p:spPr>
+        <p:txBody>
+          <a:bodyPr wrap="square" rtlCol="0">
+            <a:spAutoFit/>
+          </a:bodyPr>
+          <a:lstStyle/>
+          <a:p>
+            <a:pPr algn="ctr"/>
+            <a:r>
+              <a:rPr lang="en-US" sz="1100" dirty="0"/>
+              <a:t>Periodically post:</a:t>
+            </a:r>
+          </a:p>
+          <a:p>
+            <a:pPr algn="ctr"/>
+            <a:r>
+              <a:rPr lang="en-US" sz="1100" dirty="0"/>
+              <a:t>Stats / health</a:t>
+            </a:r>
+          </a:p>
+        </p:txBody>
+      </p:sp>
       <p:cxnSp>
         <p:nvCxnSpPr>
-          <p:cNvPr id="41" name="Straight Arrow Connector 40">
-            <a:extLst>
-              <a:ext uri="{FF2B5EF4-FFF2-40B4-BE49-F238E27FC236}">
-                <a16:creationId xmlns:a16="http://schemas.microsoft.com/office/drawing/2014/main" id="{C6587A6B-D58D-3D44-947D-07B02E6BEA27}"/>
+          <p:cNvPr id="72" name="Straight Arrow Connector 71">
+            <a:extLst>
+              <a:ext uri="{FF2B5EF4-FFF2-40B4-BE49-F238E27FC236}">
+                <a16:creationId xmlns:a16="http://schemas.microsoft.com/office/drawing/2014/main" id="{3063FEC0-EFAD-7C4B-9B2A-BFA6621C4B7F}"/>
               </a:ext>
             </a:extLst>
           </p:cNvPr>
@@ -4403,9 +5082,9 @@
           <p:nvPr/>
         </p:nvCxnSpPr>
         <p:spPr>
-          <a:xfrm>
-            <a:off x="7920428" y="4122545"/>
-            <a:ext cx="2255921" cy="910714"/>
+          <a:xfrm flipH="1">
+            <a:off x="2734815" y="6206080"/>
+            <a:ext cx="3553613" cy="0"/>
           </a:xfrm>
           <a:prstGeom prst="straightConnector1">
             <a:avLst/>
@@ -4431,10 +5110,10 @@
       </p:cxnSp>
       <p:sp>
         <p:nvSpPr>
-          <p:cNvPr id="43" name="TextBox 42">
-            <a:extLst>
-              <a:ext uri="{FF2B5EF4-FFF2-40B4-BE49-F238E27FC236}">
-                <a16:creationId xmlns:a16="http://schemas.microsoft.com/office/drawing/2014/main" id="{0D9B15E1-CAB1-BB4B-92A0-07CFB200A007}"/>
+          <p:cNvPr id="73" name="TextBox 72">
+            <a:extLst>
+              <a:ext uri="{FF2B5EF4-FFF2-40B4-BE49-F238E27FC236}">
+                <a16:creationId xmlns:a16="http://schemas.microsoft.com/office/drawing/2014/main" id="{E7E55EAE-A124-2742-90B2-BCDBA4D9A955}"/>
               </a:ext>
             </a:extLst>
           </p:cNvPr>
@@ -4443,8 +5122,8 @@
         </p:nvSpPr>
         <p:spPr>
           <a:xfrm>
-            <a:off x="887094" y="1341916"/>
-            <a:ext cx="1638677" cy="461665"/>
+            <a:off x="3723734" y="5997099"/>
+            <a:ext cx="1489706" cy="430887"/>
           </a:xfrm>
           <a:prstGeom prst="rect">
             <a:avLst/>
@@ -4459,227 +5138,25 @@
           <a:p>
             <a:pPr algn="ctr"/>
             <a:r>
-              <a:rPr lang="en-US" sz="1200" dirty="0" err="1"/>
-              <a:t>Webhook</a:t>
-            </a:r>
-            <a:r>
-              <a:rPr lang="en-US" sz="1200" dirty="0"/>
-              <a:t> ‘commit’ message</a:t>
-            </a:r>
-          </a:p>
-        </p:txBody>
-      </p:sp>
-      <p:sp>
-        <p:nvSpPr>
-          <p:cNvPr id="33" name="TextBox 32">
-            <a:extLst>
-              <a:ext uri="{FF2B5EF4-FFF2-40B4-BE49-F238E27FC236}">
-                <a16:creationId xmlns:a16="http://schemas.microsoft.com/office/drawing/2014/main" id="{57C89082-3E23-FC4A-AC52-C2AF8FB61BD7}"/>
-              </a:ext>
-            </a:extLst>
-          </p:cNvPr>
-          <p:cNvSpPr txBox="1"/>
-          <p:nvPr/>
-        </p:nvSpPr>
-        <p:spPr>
-          <a:xfrm>
-            <a:off x="2961104" y="1849450"/>
-            <a:ext cx="1638677" cy="461665"/>
-          </a:xfrm>
-          <a:prstGeom prst="rect">
-            <a:avLst/>
-          </a:prstGeom>
-          <a:noFill/>
-        </p:spPr>
-        <p:txBody>
-          <a:bodyPr wrap="square" rtlCol="0">
-            <a:spAutoFit/>
-          </a:bodyPr>
-          <a:lstStyle/>
+              <a:rPr lang="en-US" sz="1100" dirty="0"/>
+              <a:t>Periodically post:</a:t>
+            </a:r>
+          </a:p>
           <a:p>
             <a:pPr algn="ctr"/>
             <a:r>
-              <a:rPr lang="en-US" sz="1200" dirty="0"/>
-              <a:t>Inspect what</a:t>
-            </a:r>
-          </a:p>
-          <a:p>
-            <a:pPr algn="ctr"/>
-            <a:r>
-              <a:rPr lang="en-US" sz="1200" dirty="0"/>
-              <a:t>was ‘</a:t>
-            </a:r>
-            <a:r>
-              <a:rPr lang="en-US" sz="1200" dirty="0" err="1"/>
-              <a:t>commit’ed</a:t>
-            </a:r>
-            <a:endParaRPr lang="en-US" sz="1200" dirty="0"/>
-          </a:p>
-        </p:txBody>
-      </p:sp>
-      <p:sp>
-        <p:nvSpPr>
-          <p:cNvPr id="35" name="TextBox 34">
-            <a:extLst>
-              <a:ext uri="{FF2B5EF4-FFF2-40B4-BE49-F238E27FC236}">
-                <a16:creationId xmlns:a16="http://schemas.microsoft.com/office/drawing/2014/main" id="{1F8A2A5F-0338-F844-A394-BC9DED95FD6C}"/>
-              </a:ext>
-            </a:extLst>
-          </p:cNvPr>
-          <p:cNvSpPr txBox="1"/>
-          <p:nvPr/>
-        </p:nvSpPr>
-        <p:spPr>
-          <a:xfrm>
-            <a:off x="950626" y="3612804"/>
-            <a:ext cx="3193320" cy="276999"/>
-          </a:xfrm>
-          <a:prstGeom prst="rect">
-            <a:avLst/>
-          </a:prstGeom>
-          <a:noFill/>
-        </p:spPr>
-        <p:txBody>
-          <a:bodyPr wrap="square" rtlCol="0">
-            <a:spAutoFit/>
-          </a:bodyPr>
-          <a:lstStyle/>
-          <a:p>
-            <a:pPr algn="ctr"/>
-            <a:r>
-              <a:rPr lang="en-US" sz="1200" dirty="0"/>
-              <a:t>Received “</a:t>
-            </a:r>
-            <a:r>
-              <a:rPr lang="en-US" sz="1200" dirty="0" err="1"/>
-              <a:t>download_url</a:t>
-            </a:r>
-            <a:r>
-              <a:rPr lang="en-US" sz="1200" dirty="0"/>
-              <a:t>” for Service Definition.</a:t>
-            </a:r>
-          </a:p>
-        </p:txBody>
-      </p:sp>
-      <p:sp>
-        <p:nvSpPr>
-          <p:cNvPr id="40" name="TextBox 39">
-            <a:extLst>
-              <a:ext uri="{FF2B5EF4-FFF2-40B4-BE49-F238E27FC236}">
-                <a16:creationId xmlns:a16="http://schemas.microsoft.com/office/drawing/2014/main" id="{A788A7F2-AD94-7242-B019-1F7FAC2C995E}"/>
-              </a:ext>
-            </a:extLst>
-          </p:cNvPr>
-          <p:cNvSpPr txBox="1"/>
-          <p:nvPr/>
-        </p:nvSpPr>
-        <p:spPr>
-          <a:xfrm>
-            <a:off x="4617854" y="3839741"/>
-            <a:ext cx="3193320" cy="276999"/>
-          </a:xfrm>
-          <a:prstGeom prst="rect">
-            <a:avLst/>
-          </a:prstGeom>
-          <a:noFill/>
-        </p:spPr>
-        <p:txBody>
-          <a:bodyPr wrap="square" rtlCol="0">
-            <a:spAutoFit/>
-          </a:bodyPr>
-          <a:lstStyle/>
-          <a:p>
-            <a:pPr algn="ctr"/>
-            <a:r>
-              <a:rPr lang="en-US" sz="1200" dirty="0"/>
-              <a:t>‘new’ service definition = deploy</a:t>
-            </a:r>
-          </a:p>
-        </p:txBody>
-      </p:sp>
-      <p:sp>
-        <p:nvSpPr>
-          <p:cNvPr id="42" name="TextBox 41">
-            <a:extLst>
-              <a:ext uri="{FF2B5EF4-FFF2-40B4-BE49-F238E27FC236}">
-                <a16:creationId xmlns:a16="http://schemas.microsoft.com/office/drawing/2014/main" id="{BE805D1D-A2D9-144E-8C96-76FCD810AA3D}"/>
-              </a:ext>
-            </a:extLst>
-          </p:cNvPr>
-          <p:cNvSpPr txBox="1"/>
-          <p:nvPr/>
-        </p:nvSpPr>
-        <p:spPr>
-          <a:xfrm rot="1349844">
-            <a:off x="4565065" y="4584613"/>
-            <a:ext cx="3193320" cy="276999"/>
-          </a:xfrm>
-          <a:prstGeom prst="rect">
-            <a:avLst/>
-          </a:prstGeom>
-          <a:noFill/>
-        </p:spPr>
-        <p:txBody>
-          <a:bodyPr wrap="square" rtlCol="0">
-            <a:spAutoFit/>
-          </a:bodyPr>
-          <a:lstStyle/>
-          <a:p>
-            <a:pPr algn="ctr"/>
-            <a:r>
-              <a:rPr lang="en-US" sz="1200" dirty="0"/>
-              <a:t>‘modified’ service definition = redeploy</a:t>
-            </a:r>
-          </a:p>
-        </p:txBody>
-      </p:sp>
-      <p:sp>
-        <p:nvSpPr>
-          <p:cNvPr id="45" name="TextBox 44">
-            <a:extLst>
-              <a:ext uri="{FF2B5EF4-FFF2-40B4-BE49-F238E27FC236}">
-                <a16:creationId xmlns:a16="http://schemas.microsoft.com/office/drawing/2014/main" id="{D5D6BB5A-D64E-0744-A7D0-277A567D5B79}"/>
-              </a:ext>
-            </a:extLst>
-          </p:cNvPr>
-          <p:cNvSpPr txBox="1"/>
-          <p:nvPr/>
-        </p:nvSpPr>
-        <p:spPr>
-          <a:xfrm rot="2213938">
-            <a:off x="4471394" y="5205620"/>
-            <a:ext cx="3193320" cy="276999"/>
-          </a:xfrm>
-          <a:prstGeom prst="rect">
-            <a:avLst/>
-          </a:prstGeom>
-          <a:noFill/>
-        </p:spPr>
-        <p:txBody>
-          <a:bodyPr wrap="square" rtlCol="0">
-            <a:spAutoFit/>
-          </a:bodyPr>
-          <a:lstStyle/>
-          <a:p>
-            <a:pPr algn="ctr"/>
-            <a:r>
-              <a:rPr lang="en-US" sz="1200" dirty="0"/>
-              <a:t>‘deleted’ service definition = </a:t>
-            </a:r>
-            <a:r>
-              <a:rPr lang="en-US" sz="1200" dirty="0" err="1"/>
-              <a:t>undeploy</a:t>
-            </a:r>
-            <a:endParaRPr lang="en-US" sz="1200" dirty="0"/>
-          </a:p>
-        </p:txBody>
-      </p:sp>
-      <p:sp>
-        <p:nvSpPr>
-          <p:cNvPr id="3" name="Line Callout 1 2">
-            <a:extLst>
-              <a:ext uri="{FF2B5EF4-FFF2-40B4-BE49-F238E27FC236}">
-                <a16:creationId xmlns:a16="http://schemas.microsoft.com/office/drawing/2014/main" id="{E5C21516-7534-0845-BCDD-52CCBB3AB00D}"/>
+              <a:rPr lang="en-US" sz="1100" dirty="0"/>
+              <a:t>Stats / health</a:t>
+            </a:r>
+          </a:p>
+        </p:txBody>
+      </p:sp>
+      <p:sp>
+        <p:nvSpPr>
+          <p:cNvPr id="74" name="Line Callout 1 73">
+            <a:extLst>
+              <a:ext uri="{FF2B5EF4-FFF2-40B4-BE49-F238E27FC236}">
+                <a16:creationId xmlns:a16="http://schemas.microsoft.com/office/drawing/2014/main" id="{DC35A538-7BBA-1242-9CA0-18A8B07FB5E7}"/>
               </a:ext>
             </a:extLst>
           </p:cNvPr>
@@ -4688,15 +5165,15 @@
         </p:nvSpPr>
         <p:spPr>
           <a:xfrm>
-            <a:off x="446877" y="5664728"/>
-            <a:ext cx="2553173" cy="1103009"/>
+            <a:off x="76661" y="1982858"/>
+            <a:ext cx="1441199" cy="1213310"/>
           </a:xfrm>
           <a:prstGeom prst="borderCallout1">
             <a:avLst>
               <a:gd name="adj1" fmla="val 55787"/>
               <a:gd name="adj2" fmla="val 100050"/>
-              <a:gd name="adj3" fmla="val -6717"/>
-              <a:gd name="adj4" fmla="val 149670"/>
+              <a:gd name="adj3" fmla="val 98461"/>
+              <a:gd name="adj4" fmla="val 164172"/>
             </a:avLst>
           </a:prstGeom>
           <a:noFill/>
@@ -4723,52 +5200,37 @@
           <a:p>
             <a:pPr algn="ctr"/>
             <a:r>
-              <a:rPr lang="en-US" dirty="0">
+              <a:rPr lang="en-US" sz="1100" dirty="0">
                 <a:solidFill>
                   <a:srgbClr val="FF0000"/>
                 </a:solidFill>
               </a:rPr>
-              <a:t>Un-deploy:</a:t>
+              <a:t>NOTE: For Service Def deletion, must get ‘last commit -1’</a:t>
             </a:r>
             <a:br>
-              <a:rPr lang="en-US" dirty="0">
+              <a:rPr lang="en-US" sz="1100" dirty="0">
                 <a:solidFill>
                   <a:srgbClr val="FF0000"/>
                 </a:solidFill>
               </a:rPr>
             </a:br>
             <a:r>
-              <a:rPr lang="en-US" dirty="0">
+              <a:rPr lang="en-US" sz="1100" dirty="0">
                 <a:solidFill>
                   <a:srgbClr val="FF0000"/>
                 </a:solidFill>
               </a:rPr>
-              <a:t>get last commit -1</a:t>
-            </a:r>
-            <a:br>
-              <a:rPr lang="en-US" dirty="0">
-                <a:solidFill>
-                  <a:srgbClr val="FF0000"/>
-                </a:solidFill>
-              </a:rPr>
-            </a:br>
-            <a:r>
-              <a:rPr lang="en-US" dirty="0">
-                <a:solidFill>
-                  <a:srgbClr val="FF0000"/>
-                </a:solidFill>
-              </a:rPr>
-              <a:t>(data before deletion)</a:t>
-            </a:r>
-          </a:p>
-        </p:txBody>
-      </p:sp>
-      <p:sp>
-        <p:nvSpPr>
-          <p:cNvPr id="46" name="Arc 45">
-            <a:extLst>
-              <a:ext uri="{FF2B5EF4-FFF2-40B4-BE49-F238E27FC236}">
-                <a16:creationId xmlns:a16="http://schemas.microsoft.com/office/drawing/2014/main" id="{F7639342-1D23-E845-BC56-0B2A78D108A1}"/>
+              <a:t>to retrieve the data before the service definition deletion</a:t>
+            </a:r>
+          </a:p>
+        </p:txBody>
+      </p:sp>
+      <p:sp>
+        <p:nvSpPr>
+          <p:cNvPr id="2" name="Left Brace 1">
+            <a:extLst>
+              <a:ext uri="{FF2B5EF4-FFF2-40B4-BE49-F238E27FC236}">
+                <a16:creationId xmlns:a16="http://schemas.microsoft.com/office/drawing/2014/main" id="{9FDB4DFA-09FB-864F-B079-3D970B410F85}"/>
               </a:ext>
             </a:extLst>
           </p:cNvPr>
@@ -4776,20 +5238,17 @@
           <p:nvPr/>
         </p:nvSpPr>
         <p:spPr>
-          <a:xfrm rot="11798597">
-            <a:off x="-635786" y="3793305"/>
-            <a:ext cx="12428888" cy="2062336"/>
-          </a:xfrm>
-          <a:prstGeom prst="arc">
-            <a:avLst>
-              <a:gd name="adj1" fmla="val 12641752"/>
-              <a:gd name="adj2" fmla="val 21124244"/>
-            </a:avLst>
+          <a:xfrm>
+            <a:off x="10242771" y="4467423"/>
+            <a:ext cx="272825" cy="996046"/>
+          </a:xfrm>
+          <a:prstGeom prst="leftBrace">
+            <a:avLst/>
           </a:prstGeom>
           <a:ln>
-            <a:prstDash val="dash"/>
-            <a:headEnd type="none"/>
-            <a:tailEnd type="triangle"/>
+            <a:solidFill>
+              <a:schemeClr val="accent2"/>
+            </a:solidFill>
           </a:ln>
         </p:spPr>
         <p:style>
@@ -4817,10 +5276,10 @@
       </p:sp>
       <p:sp>
         <p:nvSpPr>
-          <p:cNvPr id="48" name="TextBox 47">
-            <a:extLst>
-              <a:ext uri="{FF2B5EF4-FFF2-40B4-BE49-F238E27FC236}">
-                <a16:creationId xmlns:a16="http://schemas.microsoft.com/office/drawing/2014/main" id="{4B097D1B-9E65-D747-BA36-FE9374536821}"/>
+          <p:cNvPr id="3" name="TextBox 2">
+            <a:extLst>
+              <a:ext uri="{FF2B5EF4-FFF2-40B4-BE49-F238E27FC236}">
+                <a16:creationId xmlns:a16="http://schemas.microsoft.com/office/drawing/2014/main" id="{6E8496CB-F504-604A-AE72-DAFDBB65F4AC}"/>
               </a:ext>
             </a:extLst>
           </p:cNvPr>
@@ -4828,9 +5287,9 @@
           <p:nvPr/>
         </p:nvSpPr>
         <p:spPr>
-          <a:xfrm>
-            <a:off x="4513657" y="3053982"/>
-            <a:ext cx="1429942" cy="461665"/>
+          <a:xfrm rot="16200000">
+            <a:off x="10230511" y="4773071"/>
+            <a:ext cx="570170" cy="369332"/>
           </a:xfrm>
           <a:prstGeom prst="rect">
             <a:avLst/>
@@ -4843,16 +5302,10 @@
           </a:bodyPr>
           <a:lstStyle/>
           <a:p>
-            <a:r>
-              <a:rPr lang="en-US" sz="1200" dirty="0"/>
-              <a:t>If this is a</a:t>
-            </a:r>
-            <a:br>
-              <a:rPr lang="en-US" sz="1200" dirty="0"/>
-            </a:br>
-            <a:r>
-              <a:rPr lang="en-US" sz="1200" dirty="0"/>
-              <a:t>Service Definition</a:t>
+            <a:pPr algn="ctr"/>
+            <a:r>
+              <a:rPr lang="en-US" dirty="0"/>
+              <a:t>AS3</a:t>
             </a:r>
           </a:p>
         </p:txBody>

</xml_diff>